<commit_message>
Continued Power Point gate 02
</commit_message>
<xml_diff>
--- a/Documentation/PowerPoint/Hammerjaeger.pptx
+++ b/Documentation/PowerPoint/Hammerjaeger.pptx
@@ -297,7 +297,7 @@
           <a:p>
             <a:fld id="{89232E6A-C518-4D02-8696-42F28054ACD0}" type="datetimeFigureOut">
               <a:rPr lang="de-DE" smtClean="0"/>
-              <a:t>14.06.2018</a:t>
+              <a:t>12.07.2018</a:t>
             </a:fld>
             <a:endParaRPr lang="de-DE"/>
           </a:p>
@@ -339,7 +339,7 @@
           <a:p>
             <a:fld id="{9317FBEA-A908-46D2-AF5B-BD8B431257B0}" type="slidenum">
               <a:rPr lang="de-DE" smtClean="0"/>
-              <a:t>‹Nr.›</a:t>
+              <a:t>‹#›</a:t>
             </a:fld>
             <a:endParaRPr lang="de-DE"/>
           </a:p>
@@ -467,7 +467,7 @@
           <a:p>
             <a:fld id="{89232E6A-C518-4D02-8696-42F28054ACD0}" type="datetimeFigureOut">
               <a:rPr lang="de-DE" smtClean="0"/>
-              <a:t>14.06.2018</a:t>
+              <a:t>12.07.2018</a:t>
             </a:fld>
             <a:endParaRPr lang="de-DE"/>
           </a:p>
@@ -509,7 +509,7 @@
           <a:p>
             <a:fld id="{9317FBEA-A908-46D2-AF5B-BD8B431257B0}" type="slidenum">
               <a:rPr lang="de-DE" smtClean="0"/>
-              <a:t>‹Nr.›</a:t>
+              <a:t>‹#›</a:t>
             </a:fld>
             <a:endParaRPr lang="de-DE"/>
           </a:p>
@@ -647,7 +647,7 @@
           <a:p>
             <a:fld id="{89232E6A-C518-4D02-8696-42F28054ACD0}" type="datetimeFigureOut">
               <a:rPr lang="de-DE" smtClean="0"/>
-              <a:t>14.06.2018</a:t>
+              <a:t>12.07.2018</a:t>
             </a:fld>
             <a:endParaRPr lang="de-DE"/>
           </a:p>
@@ -689,7 +689,7 @@
           <a:p>
             <a:fld id="{9317FBEA-A908-46D2-AF5B-BD8B431257B0}" type="slidenum">
               <a:rPr lang="de-DE" smtClean="0"/>
-              <a:t>‹Nr.›</a:t>
+              <a:t>‹#›</a:t>
             </a:fld>
             <a:endParaRPr lang="de-DE"/>
           </a:p>
@@ -817,7 +817,7 @@
           <a:p>
             <a:fld id="{89232E6A-C518-4D02-8696-42F28054ACD0}" type="datetimeFigureOut">
               <a:rPr lang="de-DE" smtClean="0"/>
-              <a:t>14.06.2018</a:t>
+              <a:t>12.07.2018</a:t>
             </a:fld>
             <a:endParaRPr lang="de-DE"/>
           </a:p>
@@ -859,7 +859,7 @@
           <a:p>
             <a:fld id="{9317FBEA-A908-46D2-AF5B-BD8B431257B0}" type="slidenum">
               <a:rPr lang="de-DE" smtClean="0"/>
-              <a:t>‹Nr.›</a:t>
+              <a:t>‹#›</a:t>
             </a:fld>
             <a:endParaRPr lang="de-DE"/>
           </a:p>
@@ -1063,7 +1063,7 @@
           <a:p>
             <a:fld id="{89232E6A-C518-4D02-8696-42F28054ACD0}" type="datetimeFigureOut">
               <a:rPr lang="de-DE" smtClean="0"/>
-              <a:t>14.06.2018</a:t>
+              <a:t>12.07.2018</a:t>
             </a:fld>
             <a:endParaRPr lang="de-DE"/>
           </a:p>
@@ -1105,7 +1105,7 @@
           <a:p>
             <a:fld id="{9317FBEA-A908-46D2-AF5B-BD8B431257B0}" type="slidenum">
               <a:rPr lang="de-DE" smtClean="0"/>
-              <a:t>‹Nr.›</a:t>
+              <a:t>‹#›</a:t>
             </a:fld>
             <a:endParaRPr lang="de-DE"/>
           </a:p>
@@ -1351,7 +1351,7 @@
           <a:p>
             <a:fld id="{89232E6A-C518-4D02-8696-42F28054ACD0}" type="datetimeFigureOut">
               <a:rPr lang="de-DE" smtClean="0"/>
-              <a:t>14.06.2018</a:t>
+              <a:t>12.07.2018</a:t>
             </a:fld>
             <a:endParaRPr lang="de-DE"/>
           </a:p>
@@ -1393,7 +1393,7 @@
           <a:p>
             <a:fld id="{9317FBEA-A908-46D2-AF5B-BD8B431257B0}" type="slidenum">
               <a:rPr lang="de-DE" smtClean="0"/>
-              <a:t>‹Nr.›</a:t>
+              <a:t>‹#›</a:t>
             </a:fld>
             <a:endParaRPr lang="de-DE"/>
           </a:p>
@@ -1773,7 +1773,7 @@
           <a:p>
             <a:fld id="{89232E6A-C518-4D02-8696-42F28054ACD0}" type="datetimeFigureOut">
               <a:rPr lang="de-DE" smtClean="0"/>
-              <a:t>14.06.2018</a:t>
+              <a:t>12.07.2018</a:t>
             </a:fld>
             <a:endParaRPr lang="de-DE"/>
           </a:p>
@@ -1815,7 +1815,7 @@
           <a:p>
             <a:fld id="{9317FBEA-A908-46D2-AF5B-BD8B431257B0}" type="slidenum">
               <a:rPr lang="de-DE" smtClean="0"/>
-              <a:t>‹Nr.›</a:t>
+              <a:t>‹#›</a:t>
             </a:fld>
             <a:endParaRPr lang="de-DE"/>
           </a:p>
@@ -1891,7 +1891,7 @@
           <a:p>
             <a:fld id="{89232E6A-C518-4D02-8696-42F28054ACD0}" type="datetimeFigureOut">
               <a:rPr lang="de-DE" smtClean="0"/>
-              <a:t>14.06.2018</a:t>
+              <a:t>12.07.2018</a:t>
             </a:fld>
             <a:endParaRPr lang="de-DE"/>
           </a:p>
@@ -1933,7 +1933,7 @@
           <a:p>
             <a:fld id="{9317FBEA-A908-46D2-AF5B-BD8B431257B0}" type="slidenum">
               <a:rPr lang="de-DE" smtClean="0"/>
-              <a:t>‹Nr.›</a:t>
+              <a:t>‹#›</a:t>
             </a:fld>
             <a:endParaRPr lang="de-DE"/>
           </a:p>
@@ -1986,7 +1986,7 @@
           <a:p>
             <a:fld id="{89232E6A-C518-4D02-8696-42F28054ACD0}" type="datetimeFigureOut">
               <a:rPr lang="de-DE" smtClean="0"/>
-              <a:t>14.06.2018</a:t>
+              <a:t>12.07.2018</a:t>
             </a:fld>
             <a:endParaRPr lang="de-DE"/>
           </a:p>
@@ -2028,7 +2028,7 @@
           <a:p>
             <a:fld id="{9317FBEA-A908-46D2-AF5B-BD8B431257B0}" type="slidenum">
               <a:rPr lang="de-DE" smtClean="0"/>
-              <a:t>‹Nr.›</a:t>
+              <a:t>‹#›</a:t>
             </a:fld>
             <a:endParaRPr lang="de-DE"/>
           </a:p>
@@ -2263,7 +2263,7 @@
           <a:p>
             <a:fld id="{89232E6A-C518-4D02-8696-42F28054ACD0}" type="datetimeFigureOut">
               <a:rPr lang="de-DE" smtClean="0"/>
-              <a:t>14.06.2018</a:t>
+              <a:t>12.07.2018</a:t>
             </a:fld>
             <a:endParaRPr lang="de-DE"/>
           </a:p>
@@ -2305,7 +2305,7 @@
           <a:p>
             <a:fld id="{9317FBEA-A908-46D2-AF5B-BD8B431257B0}" type="slidenum">
               <a:rPr lang="de-DE" smtClean="0"/>
-              <a:t>‹Nr.›</a:t>
+              <a:t>‹#›</a:t>
             </a:fld>
             <a:endParaRPr lang="de-DE"/>
           </a:p>
@@ -2516,7 +2516,7 @@
           <a:p>
             <a:fld id="{89232E6A-C518-4D02-8696-42F28054ACD0}" type="datetimeFigureOut">
               <a:rPr lang="de-DE" smtClean="0"/>
-              <a:t>14.06.2018</a:t>
+              <a:t>12.07.2018</a:t>
             </a:fld>
             <a:endParaRPr lang="de-DE"/>
           </a:p>
@@ -2558,7 +2558,7 @@
           <a:p>
             <a:fld id="{9317FBEA-A908-46D2-AF5B-BD8B431257B0}" type="slidenum">
               <a:rPr lang="de-DE" smtClean="0"/>
-              <a:t>‹Nr.›</a:t>
+              <a:t>‹#›</a:t>
             </a:fld>
             <a:endParaRPr lang="de-DE"/>
           </a:p>
@@ -2739,7 +2739,7 @@
           <a:p>
             <a:fld id="{89232E6A-C518-4D02-8696-42F28054ACD0}" type="datetimeFigureOut">
               <a:rPr lang="de-DE" smtClean="0"/>
-              <a:t>14.06.2018</a:t>
+              <a:t>12.07.2018</a:t>
             </a:fld>
             <a:endParaRPr lang="de-DE"/>
           </a:p>
@@ -2817,7 +2817,7 @@
           <a:p>
             <a:fld id="{9317FBEA-A908-46D2-AF5B-BD8B431257B0}" type="slidenum">
               <a:rPr lang="de-DE" smtClean="0"/>
-              <a:t>‹Nr.›</a:t>
+              <a:t>‹#›</a:t>
             </a:fld>
             <a:endParaRPr lang="de-DE"/>
           </a:p>
@@ -4507,16 +4507,7 @@
                 </a:solidFill>
                 <a:latin typeface="TeXGyreAdventor" pitchFamily="50" charset="0"/>
               </a:rPr>
-              <a:t>Level </a:t>
-            </a:r>
-            <a:r>
-              <a:rPr lang="de-DE" b="1" dirty="0" smtClean="0">
-                <a:solidFill>
-                  <a:schemeClr val="bg1"/>
-                </a:solidFill>
-                <a:latin typeface="TeXGyreAdventor" pitchFamily="50" charset="0"/>
-              </a:rPr>
-              <a:t>Design</a:t>
+              <a:t>Level Design</a:t>
             </a:r>
           </a:p>
           <a:p>
@@ -5433,12 +5424,6 @@
               </a:rPr>
               <a:t>!</a:t>
             </a:r>
-            <a:endParaRPr lang="de-DE" dirty="0" smtClean="0">
-              <a:solidFill>
-                <a:schemeClr val="bg1"/>
-              </a:solidFill>
-              <a:latin typeface="TeXGyreAdventor" pitchFamily="50" charset="0"/>
-            </a:endParaRPr>
           </a:p>
           <a:p>
             <a:endParaRPr lang="de-DE" dirty="0">
@@ -6506,16 +6491,7 @@
                 </a:solidFill>
                 <a:latin typeface="TeXGyreAdventor" pitchFamily="50" charset="0"/>
               </a:rPr>
-              <a:t> </a:t>
-            </a:r>
-            <a:r>
-              <a:rPr lang="de-DE" dirty="0" smtClean="0">
-                <a:solidFill>
-                  <a:schemeClr val="bg1"/>
-                </a:solidFill>
-                <a:latin typeface="TeXGyreAdventor" pitchFamily="50" charset="0"/>
-              </a:rPr>
-              <a:t>Animation</a:t>
+              <a:t> Animation</a:t>
             </a:r>
           </a:p>
           <a:p>
@@ -6573,12 +6549,6 @@
               </a:rPr>
               <a:t>Hintergrund</a:t>
             </a:r>
-            <a:endParaRPr lang="de-DE" dirty="0" smtClean="0">
-              <a:solidFill>
-                <a:schemeClr val="bg1"/>
-              </a:solidFill>
-              <a:latin typeface="TeXGyreAdventor" pitchFamily="50" charset="0"/>
-            </a:endParaRPr>
           </a:p>
           <a:p>
             <a:endParaRPr lang="de-DE" dirty="0">

</xml_diff>